<commit_message>
soem small docu fixes
</commit_message>
<xml_diff>
--- a/documentation/Interaction_examples_visual.pptx
+++ b/documentation/Interaction_examples_visual.pptx
@@ -279,7 +279,7 @@
           <a:p>
             <a:fld id="{CC17145A-0342-4924-840D-BBCF9AF95DAD}" type="datetimeFigureOut">
               <a:rPr lang="en-US" smtClean="0"/>
-              <a:t>14-Mar-18</a:t>
+              <a:t>27-Mar-18</a:t>
             </a:fld>
             <a:endParaRPr lang="en-US"/>
           </a:p>
@@ -477,7 +477,7 @@
           <a:p>
             <a:fld id="{CC17145A-0342-4924-840D-BBCF9AF95DAD}" type="datetimeFigureOut">
               <a:rPr lang="en-US" smtClean="0"/>
-              <a:t>14-Mar-18</a:t>
+              <a:t>27-Mar-18</a:t>
             </a:fld>
             <a:endParaRPr lang="en-US"/>
           </a:p>
@@ -685,7 +685,7 @@
           <a:p>
             <a:fld id="{CC17145A-0342-4924-840D-BBCF9AF95DAD}" type="datetimeFigureOut">
               <a:rPr lang="en-US" smtClean="0"/>
-              <a:t>14-Mar-18</a:t>
+              <a:t>27-Mar-18</a:t>
             </a:fld>
             <a:endParaRPr lang="en-US"/>
           </a:p>
@@ -883,7 +883,7 @@
           <a:p>
             <a:fld id="{CC17145A-0342-4924-840D-BBCF9AF95DAD}" type="datetimeFigureOut">
               <a:rPr lang="en-US" smtClean="0"/>
-              <a:t>14-Mar-18</a:t>
+              <a:t>27-Mar-18</a:t>
             </a:fld>
             <a:endParaRPr lang="en-US"/>
           </a:p>
@@ -1158,7 +1158,7 @@
           <a:p>
             <a:fld id="{CC17145A-0342-4924-840D-BBCF9AF95DAD}" type="datetimeFigureOut">
               <a:rPr lang="en-US" smtClean="0"/>
-              <a:t>14-Mar-18</a:t>
+              <a:t>27-Mar-18</a:t>
             </a:fld>
             <a:endParaRPr lang="en-US"/>
           </a:p>
@@ -1423,7 +1423,7 @@
           <a:p>
             <a:fld id="{CC17145A-0342-4924-840D-BBCF9AF95DAD}" type="datetimeFigureOut">
               <a:rPr lang="en-US" smtClean="0"/>
-              <a:t>14-Mar-18</a:t>
+              <a:t>27-Mar-18</a:t>
             </a:fld>
             <a:endParaRPr lang="en-US"/>
           </a:p>
@@ -1835,7 +1835,7 @@
           <a:p>
             <a:fld id="{CC17145A-0342-4924-840D-BBCF9AF95DAD}" type="datetimeFigureOut">
               <a:rPr lang="en-US" smtClean="0"/>
-              <a:t>14-Mar-18</a:t>
+              <a:t>27-Mar-18</a:t>
             </a:fld>
             <a:endParaRPr lang="en-US"/>
           </a:p>
@@ -1976,7 +1976,7 @@
           <a:p>
             <a:fld id="{CC17145A-0342-4924-840D-BBCF9AF95DAD}" type="datetimeFigureOut">
               <a:rPr lang="en-US" smtClean="0"/>
-              <a:t>14-Mar-18</a:t>
+              <a:t>27-Mar-18</a:t>
             </a:fld>
             <a:endParaRPr lang="en-US"/>
           </a:p>
@@ -2089,7 +2089,7 @@
           <a:p>
             <a:fld id="{CC17145A-0342-4924-840D-BBCF9AF95DAD}" type="datetimeFigureOut">
               <a:rPr lang="en-US" smtClean="0"/>
-              <a:t>14-Mar-18</a:t>
+              <a:t>27-Mar-18</a:t>
             </a:fld>
             <a:endParaRPr lang="en-US"/>
           </a:p>
@@ -2400,7 +2400,7 @@
           <a:p>
             <a:fld id="{CC17145A-0342-4924-840D-BBCF9AF95DAD}" type="datetimeFigureOut">
               <a:rPr lang="en-US" smtClean="0"/>
-              <a:t>14-Mar-18</a:t>
+              <a:t>27-Mar-18</a:t>
             </a:fld>
             <a:endParaRPr lang="en-US"/>
           </a:p>
@@ -2688,7 +2688,7 @@
           <a:p>
             <a:fld id="{CC17145A-0342-4924-840D-BBCF9AF95DAD}" type="datetimeFigureOut">
               <a:rPr lang="en-US" smtClean="0"/>
-              <a:t>14-Mar-18</a:t>
+              <a:t>27-Mar-18</a:t>
             </a:fld>
             <a:endParaRPr lang="en-US"/>
           </a:p>
@@ -2929,7 +2929,7 @@
           <a:p>
             <a:fld id="{CC17145A-0342-4924-840D-BBCF9AF95DAD}" type="datetimeFigureOut">
               <a:rPr lang="en-US" smtClean="0"/>
-              <a:t>14-Mar-18</a:t>
+              <a:t>27-Mar-18</a:t>
             </a:fld>
             <a:endParaRPr lang="en-US"/>
           </a:p>
@@ -9029,8 +9029,8 @@
           </a:p>
           <a:p>
             <a:r>
-              <a:rPr lang="en-US" dirty="0" err="1"/>
-              <a:t>lceGraphicGapentry</a:t>
+              <a:rPr lang="en-US"/>
+              <a:t>lceGraphicTextEntry</a:t>
             </a:r>
             <a:endParaRPr lang="en-US" dirty="0"/>
           </a:p>

</xml_diff>

<commit_message>
add docu for number pyramid
</commit_message>
<xml_diff>
--- a/documentation/Interaction_examples_visual.pptx
+++ b/documentation/Interaction_examples_visual.pptx
@@ -19,15 +19,16 @@
     <p:sldId id="257" r:id="rId13"/>
     <p:sldId id="259" r:id="rId14"/>
     <p:sldId id="260" r:id="rId15"/>
-    <p:sldId id="278" r:id="rId16"/>
-    <p:sldId id="263" r:id="rId17"/>
-    <p:sldId id="277" r:id="rId18"/>
-    <p:sldId id="267" r:id="rId19"/>
-    <p:sldId id="258" r:id="rId20"/>
-    <p:sldId id="262" r:id="rId21"/>
-    <p:sldId id="261" r:id="rId22"/>
-    <p:sldId id="265" r:id="rId23"/>
-    <p:sldId id="266" r:id="rId24"/>
+    <p:sldId id="279" r:id="rId16"/>
+    <p:sldId id="278" r:id="rId17"/>
+    <p:sldId id="263" r:id="rId18"/>
+    <p:sldId id="277" r:id="rId19"/>
+    <p:sldId id="267" r:id="rId20"/>
+    <p:sldId id="258" r:id="rId21"/>
+    <p:sldId id="262" r:id="rId22"/>
+    <p:sldId id="261" r:id="rId23"/>
+    <p:sldId id="265" r:id="rId24"/>
+    <p:sldId id="266" r:id="rId25"/>
   </p:sldIdLst>
   <p:sldSz cx="12192000" cy="6858000"/>
   <p:notesSz cx="6858000" cy="9144000"/>
@@ -281,7 +282,7 @@
           <a:p>
             <a:fld id="{CC17145A-0342-4924-840D-BBCF9AF95DAD}" type="datetimeFigureOut">
               <a:rPr lang="en-US" smtClean="0"/>
-              <a:t>27-Feb-20</a:t>
+              <a:t>28-Feb-20</a:t>
             </a:fld>
             <a:endParaRPr lang="en-US"/>
           </a:p>
@@ -479,7 +480,7 @@
           <a:p>
             <a:fld id="{CC17145A-0342-4924-840D-BBCF9AF95DAD}" type="datetimeFigureOut">
               <a:rPr lang="en-US" smtClean="0"/>
-              <a:t>27-Feb-20</a:t>
+              <a:t>28-Feb-20</a:t>
             </a:fld>
             <a:endParaRPr lang="en-US"/>
           </a:p>
@@ -687,7 +688,7 @@
           <a:p>
             <a:fld id="{CC17145A-0342-4924-840D-BBCF9AF95DAD}" type="datetimeFigureOut">
               <a:rPr lang="en-US" smtClean="0"/>
-              <a:t>27-Feb-20</a:t>
+              <a:t>28-Feb-20</a:t>
             </a:fld>
             <a:endParaRPr lang="en-US"/>
           </a:p>
@@ -885,7 +886,7 @@
           <a:p>
             <a:fld id="{CC17145A-0342-4924-840D-BBCF9AF95DAD}" type="datetimeFigureOut">
               <a:rPr lang="en-US" smtClean="0"/>
-              <a:t>27-Feb-20</a:t>
+              <a:t>28-Feb-20</a:t>
             </a:fld>
             <a:endParaRPr lang="en-US"/>
           </a:p>
@@ -1160,7 +1161,7 @@
           <a:p>
             <a:fld id="{CC17145A-0342-4924-840D-BBCF9AF95DAD}" type="datetimeFigureOut">
               <a:rPr lang="en-US" smtClean="0"/>
-              <a:t>27-Feb-20</a:t>
+              <a:t>28-Feb-20</a:t>
             </a:fld>
             <a:endParaRPr lang="en-US"/>
           </a:p>
@@ -1425,7 +1426,7 @@
           <a:p>
             <a:fld id="{CC17145A-0342-4924-840D-BBCF9AF95DAD}" type="datetimeFigureOut">
               <a:rPr lang="en-US" smtClean="0"/>
-              <a:t>27-Feb-20</a:t>
+              <a:t>28-Feb-20</a:t>
             </a:fld>
             <a:endParaRPr lang="en-US"/>
           </a:p>
@@ -1837,7 +1838,7 @@
           <a:p>
             <a:fld id="{CC17145A-0342-4924-840D-BBCF9AF95DAD}" type="datetimeFigureOut">
               <a:rPr lang="en-US" smtClean="0"/>
-              <a:t>27-Feb-20</a:t>
+              <a:t>28-Feb-20</a:t>
             </a:fld>
             <a:endParaRPr lang="en-US"/>
           </a:p>
@@ -1978,7 +1979,7 @@
           <a:p>
             <a:fld id="{CC17145A-0342-4924-840D-BBCF9AF95DAD}" type="datetimeFigureOut">
               <a:rPr lang="en-US" smtClean="0"/>
-              <a:t>27-Feb-20</a:t>
+              <a:t>28-Feb-20</a:t>
             </a:fld>
             <a:endParaRPr lang="en-US"/>
           </a:p>
@@ -2091,7 +2092,7 @@
           <a:p>
             <a:fld id="{CC17145A-0342-4924-840D-BBCF9AF95DAD}" type="datetimeFigureOut">
               <a:rPr lang="en-US" smtClean="0"/>
-              <a:t>27-Feb-20</a:t>
+              <a:t>28-Feb-20</a:t>
             </a:fld>
             <a:endParaRPr lang="en-US"/>
           </a:p>
@@ -2402,7 +2403,7 @@
           <a:p>
             <a:fld id="{CC17145A-0342-4924-840D-BBCF9AF95DAD}" type="datetimeFigureOut">
               <a:rPr lang="en-US" smtClean="0"/>
-              <a:t>27-Feb-20</a:t>
+              <a:t>28-Feb-20</a:t>
             </a:fld>
             <a:endParaRPr lang="en-US"/>
           </a:p>
@@ -2690,7 +2691,7 @@
           <a:p>
             <a:fld id="{CC17145A-0342-4924-840D-BBCF9AF95DAD}" type="datetimeFigureOut">
               <a:rPr lang="en-US" smtClean="0"/>
-              <a:t>27-Feb-20</a:t>
+              <a:t>28-Feb-20</a:t>
             </a:fld>
             <a:endParaRPr lang="en-US"/>
           </a:p>
@@ -2931,7 +2932,7 @@
           <a:p>
             <a:fld id="{CC17145A-0342-4924-840D-BBCF9AF95DAD}" type="datetimeFigureOut">
               <a:rPr lang="en-US" smtClean="0"/>
-              <a:t>27-Feb-20</a:t>
+              <a:t>28-Feb-20</a:t>
             </a:fld>
             <a:endParaRPr lang="en-US"/>
           </a:p>
@@ -5162,6 +5163,186 @@
           <a:p>
             <a:r>
               <a:rPr lang="en-US" sz="1800" dirty="0" err="1"/>
+              <a:t>lceGraphicTextEntry</a:t>
+            </a:r>
+            <a:r>
+              <a:rPr lang="en-US" sz="1800" dirty="0"/>
+              <a:t> with </a:t>
+            </a:r>
+            <a:r>
+              <a:rPr lang="en-US" sz="1800" dirty="0" err="1"/>
+              <a:t>lceStartEntry</a:t>
+            </a:r>
+            <a:endParaRPr lang="en-US" sz="1800" dirty="0"/>
+          </a:p>
+        </p:txBody>
+      </p:sp>
+      <p:sp>
+        <p:nvSpPr>
+          <p:cNvPr id="3" name="Content Placeholder 2">
+            <a:extLst>
+              <a:ext uri="{FF2B5EF4-FFF2-40B4-BE49-F238E27FC236}">
+                <a16:creationId xmlns:a16="http://schemas.microsoft.com/office/drawing/2014/main" id="{A1AE635E-6BEE-4A3D-BEC1-B1DA65CC3055}"/>
+              </a:ext>
+            </a:extLst>
+          </p:cNvPr>
+          <p:cNvSpPr>
+            <a:spLocks noGrp="1"/>
+          </p:cNvSpPr>
+          <p:nvPr>
+            <p:ph idx="1"/>
+          </p:nvPr>
+        </p:nvSpPr>
+        <p:spPr>
+          <a:xfrm>
+            <a:off x="838200" y="1400458"/>
+            <a:ext cx="9993086" cy="4351338"/>
+          </a:xfrm>
+        </p:spPr>
+        <p:txBody>
+          <a:bodyPr>
+            <a:normAutofit/>
+          </a:bodyPr>
+          <a:lstStyle/>
+          <a:p>
+            <a:pPr marL="0" indent="0">
+              <a:spcBef>
+                <a:spcPts val="600"/>
+              </a:spcBef>
+              <a:buNone/>
+            </a:pPr>
+            <a:r>
+              <a:rPr lang="en-US" b="1" dirty="0">
+                <a:solidFill>
+                  <a:srgbClr val="0070C0"/>
+                </a:solidFill>
+              </a:rPr>
+              <a:t>Number pyramid</a:t>
+            </a:r>
+          </a:p>
+          <a:p>
+            <a:pPr marL="0" indent="0">
+              <a:buNone/>
+            </a:pPr>
+            <a:r>
+              <a:rPr lang="en-US" dirty="0"/>
+              <a:t>The number pyramid is built as follows: add two number in one row, which are standing next to each other. The result of this is the number above.</a:t>
+            </a:r>
+          </a:p>
+          <a:p>
+            <a:pPr marL="0" indent="0">
+              <a:buNone/>
+            </a:pPr>
+            <a:r>
+              <a:rPr lang="en-US" dirty="0"/>
+              <a:t>Fill in the missing numbers.</a:t>
+            </a:r>
+          </a:p>
+          <a:p>
+            <a:pPr marL="0" indent="0">
+              <a:buNone/>
+            </a:pPr>
+            <a:endParaRPr lang="en-US" dirty="0"/>
+          </a:p>
+          <a:p>
+            <a:pPr marL="0" indent="0">
+              <a:buNone/>
+            </a:pPr>
+            <a:endParaRPr lang="en-US" dirty="0"/>
+          </a:p>
+        </p:txBody>
+      </p:sp>
+      <p:pic>
+        <p:nvPicPr>
+          <p:cNvPr id="9" name="Picture 8">
+            <a:extLst>
+              <a:ext uri="{FF2B5EF4-FFF2-40B4-BE49-F238E27FC236}">
+                <a16:creationId xmlns:a16="http://schemas.microsoft.com/office/drawing/2014/main" id="{278F7A58-6822-415B-BD70-D92DBE4AA5C0}"/>
+              </a:ext>
+            </a:extLst>
+          </p:cNvPr>
+          <p:cNvPicPr>
+            <a:picLocks noChangeAspect="1"/>
+          </p:cNvPicPr>
+          <p:nvPr/>
+        </p:nvPicPr>
+        <p:blipFill>
+          <a:blip r:embed="rId2">
+            <a:extLst>
+              <a:ext uri="{28A0092B-C50C-407E-A947-70E740481C1C}">
+                <a14:useLocalDpi xmlns:a14="http://schemas.microsoft.com/office/drawing/2010/main" val="0"/>
+              </a:ext>
+            </a:extLst>
+          </a:blip>
+          <a:stretch>
+            <a:fillRect/>
+          </a:stretch>
+        </p:blipFill>
+        <p:spPr>
+          <a:xfrm>
+            <a:off x="5310757" y="3219507"/>
+            <a:ext cx="5057886" cy="3015955"/>
+          </a:xfrm>
+          <a:prstGeom prst="rect">
+            <a:avLst/>
+          </a:prstGeom>
+        </p:spPr>
+      </p:pic>
+    </p:spTree>
+    <p:extLst>
+      <p:ext uri="{BB962C8B-B14F-4D97-AF65-F5344CB8AC3E}">
+        <p14:creationId xmlns:p14="http://schemas.microsoft.com/office/powerpoint/2010/main" val="62601567"/>
+      </p:ext>
+    </p:extLst>
+  </p:cSld>
+  <p:clrMapOvr>
+    <a:masterClrMapping/>
+  </p:clrMapOvr>
+</p:sld>
+</file>
+
+<file path=ppt/slides/slide16.xml><?xml version="1.0" encoding="utf-8"?>
+<p:sld xmlns:a="http://schemas.openxmlformats.org/drawingml/2006/main" xmlns:r="http://schemas.openxmlformats.org/officeDocument/2006/relationships" xmlns:p="http://schemas.openxmlformats.org/presentationml/2006/main">
+  <p:cSld>
+    <p:spTree>
+      <p:nvGrpSpPr>
+        <p:cNvPr id="1" name=""/>
+        <p:cNvGrpSpPr/>
+        <p:nvPr/>
+      </p:nvGrpSpPr>
+      <p:grpSpPr>
+        <a:xfrm>
+          <a:off x="0" y="0"/>
+          <a:ext cx="0" cy="0"/>
+          <a:chOff x="0" y="0"/>
+          <a:chExt cx="0" cy="0"/>
+        </a:xfrm>
+      </p:grpSpPr>
+      <p:sp>
+        <p:nvSpPr>
+          <p:cNvPr id="2" name="Title 1">
+            <a:extLst>
+              <a:ext uri="{FF2B5EF4-FFF2-40B4-BE49-F238E27FC236}">
+                <a16:creationId xmlns:a16="http://schemas.microsoft.com/office/drawing/2014/main" id="{17546CFD-B71A-4805-8A6B-CAD10705209B}"/>
+              </a:ext>
+            </a:extLst>
+          </p:cNvPr>
+          <p:cNvSpPr>
+            <a:spLocks noGrp="1"/>
+          </p:cNvSpPr>
+          <p:nvPr>
+            <p:ph type="title"/>
+          </p:nvPr>
+        </p:nvSpPr>
+        <p:spPr/>
+        <p:txBody>
+          <a:bodyPr>
+            <a:normAutofit/>
+          </a:bodyPr>
+          <a:lstStyle/>
+          <a:p>
+            <a:r>
+              <a:rPr lang="en-US" sz="1800" dirty="0" err="1"/>
               <a:t>lceGraphicAssociate</a:t>
             </a:r>
             <a:endParaRPr lang="en-US" sz="1800" dirty="0"/>
@@ -5286,7 +5467,7 @@
 </p:sld>
 </file>
 
-<file path=ppt/slides/slide16.xml><?xml version="1.0" encoding="utf-8"?>
+<file path=ppt/slides/slide17.xml><?xml version="1.0" encoding="utf-8"?>
 <p:sld xmlns:a="http://schemas.openxmlformats.org/drawingml/2006/main" xmlns:r="http://schemas.openxmlformats.org/officeDocument/2006/relationships" xmlns:p="http://schemas.openxmlformats.org/presentationml/2006/main">
   <p:cSld>
     <p:spTree>
@@ -5654,7 +5835,7 @@
 </p:sld>
 </file>
 
-<file path=ppt/slides/slide17.xml><?xml version="1.0" encoding="utf-8"?>
+<file path=ppt/slides/slide18.xml><?xml version="1.0" encoding="utf-8"?>
 <p:sld xmlns:a="http://schemas.openxmlformats.org/drawingml/2006/main" xmlns:r="http://schemas.openxmlformats.org/officeDocument/2006/relationships" xmlns:p="http://schemas.openxmlformats.org/presentationml/2006/main">
   <p:cSld>
     <p:spTree>
@@ -6322,293 +6503,6 @@
 </p:sld>
 </file>
 
-<file path=ppt/slides/slide18.xml><?xml version="1.0" encoding="utf-8"?>
-<p:sld xmlns:a="http://schemas.openxmlformats.org/drawingml/2006/main" xmlns:r="http://schemas.openxmlformats.org/officeDocument/2006/relationships" xmlns:p="http://schemas.openxmlformats.org/presentationml/2006/main">
-  <p:cSld>
-    <p:spTree>
-      <p:nvGrpSpPr>
-        <p:cNvPr id="1" name=""/>
-        <p:cNvGrpSpPr/>
-        <p:nvPr/>
-      </p:nvGrpSpPr>
-      <p:grpSpPr>
-        <a:xfrm>
-          <a:off x="0" y="0"/>
-          <a:ext cx="0" cy="0"/>
-          <a:chOff x="0" y="0"/>
-          <a:chExt cx="0" cy="0"/>
-        </a:xfrm>
-      </p:grpSpPr>
-      <p:sp>
-        <p:nvSpPr>
-          <p:cNvPr id="2" name="Title 1">
-            <a:extLst>
-              <a:ext uri="{FF2B5EF4-FFF2-40B4-BE49-F238E27FC236}">
-                <a16:creationId xmlns:a16="http://schemas.microsoft.com/office/drawing/2014/main" id="{17546CFD-B71A-4805-8A6B-CAD10705209B}"/>
-              </a:ext>
-            </a:extLst>
-          </p:cNvPr>
-          <p:cNvSpPr>
-            <a:spLocks noGrp="1"/>
-          </p:cNvSpPr>
-          <p:nvPr>
-            <p:ph type="title"/>
-          </p:nvPr>
-        </p:nvSpPr>
-        <p:spPr/>
-        <p:txBody>
-          <a:bodyPr>
-            <a:normAutofit/>
-          </a:bodyPr>
-          <a:lstStyle/>
-          <a:p>
-            <a:r>
-              <a:rPr lang="en-US" sz="1800" dirty="0" err="1"/>
-              <a:t>lceTextEntry</a:t>
-            </a:r>
-            <a:endParaRPr lang="en-US" sz="1800" dirty="0"/>
-          </a:p>
-        </p:txBody>
-      </p:sp>
-      <p:sp>
-        <p:nvSpPr>
-          <p:cNvPr id="3" name="Content Placeholder 2">
-            <a:extLst>
-              <a:ext uri="{FF2B5EF4-FFF2-40B4-BE49-F238E27FC236}">
-                <a16:creationId xmlns:a16="http://schemas.microsoft.com/office/drawing/2014/main" id="{A1AE635E-6BEE-4A3D-BEC1-B1DA65CC3055}"/>
-              </a:ext>
-            </a:extLst>
-          </p:cNvPr>
-          <p:cNvSpPr>
-            <a:spLocks noGrp="1"/>
-          </p:cNvSpPr>
-          <p:nvPr>
-            <p:ph idx="1"/>
-          </p:nvPr>
-        </p:nvSpPr>
-        <p:spPr>
-          <a:xfrm>
-            <a:off x="838200" y="1400458"/>
-            <a:ext cx="7933051" cy="4351338"/>
-          </a:xfrm>
-        </p:spPr>
-        <p:txBody>
-          <a:bodyPr/>
-          <a:lstStyle/>
-          <a:p>
-            <a:pPr marL="0" indent="0">
-              <a:spcBef>
-                <a:spcPts val="600"/>
-              </a:spcBef>
-              <a:buNone/>
-            </a:pPr>
-            <a:r>
-              <a:rPr lang="en-US" b="1" dirty="0">
-                <a:solidFill>
-                  <a:srgbClr val="0070C0"/>
-                </a:solidFill>
-              </a:rPr>
-              <a:t>Mrs. White</a:t>
-            </a:r>
-          </a:p>
-          <a:p>
-            <a:pPr marL="0" indent="0">
-              <a:spcBef>
-                <a:spcPts val="600"/>
-              </a:spcBef>
-              <a:buNone/>
-            </a:pPr>
-            <a:r>
-              <a:rPr lang="en-US" dirty="0"/>
-              <a:t>Present Simple vs Present Continuous.</a:t>
-            </a:r>
-          </a:p>
-          <a:p>
-            <a:pPr marL="0" indent="0">
-              <a:spcBef>
-                <a:spcPts val="600"/>
-              </a:spcBef>
-              <a:buNone/>
-            </a:pPr>
-            <a:r>
-              <a:rPr lang="en-US" dirty="0"/>
-              <a:t>Fill in the right form of the verb.</a:t>
-            </a:r>
-          </a:p>
-          <a:p>
-            <a:pPr marL="0" indent="0">
-              <a:spcBef>
-                <a:spcPts val="600"/>
-              </a:spcBef>
-              <a:buNone/>
-            </a:pPr>
-            <a:endParaRPr lang="en-US" dirty="0"/>
-          </a:p>
-          <a:p>
-            <a:pPr marL="0" indent="0">
-              <a:spcBef>
-                <a:spcPts val="600"/>
-              </a:spcBef>
-              <a:buNone/>
-            </a:pPr>
-            <a:r>
-              <a:rPr lang="en-US" dirty="0"/>
-              <a:t>This is Mrs. White. She _</a:t>
-            </a:r>
-            <a:r>
-              <a:rPr lang="en-US" u="sng" dirty="0">
-                <a:solidFill>
-                  <a:schemeClr val="bg1">
-                    <a:lumMod val="65000"/>
-                  </a:schemeClr>
-                </a:solidFill>
-              </a:rPr>
-              <a:t>is</a:t>
-            </a:r>
-            <a:r>
-              <a:rPr lang="en-US" dirty="0"/>
-              <a:t>_ (be) a primary school teacher.</a:t>
-            </a:r>
-          </a:p>
-          <a:p>
-            <a:pPr marL="0" indent="0">
-              <a:spcBef>
-                <a:spcPts val="600"/>
-              </a:spcBef>
-              <a:buNone/>
-            </a:pPr>
-            <a:r>
-              <a:rPr lang="en-US" dirty="0"/>
-              <a:t>She _</a:t>
-            </a:r>
-            <a:r>
-              <a:rPr lang="en-US" u="sng" dirty="0">
-                <a:solidFill>
-                  <a:schemeClr val="bg1">
-                    <a:lumMod val="65000"/>
-                  </a:schemeClr>
-                </a:solidFill>
-              </a:rPr>
-              <a:t>teaches</a:t>
-            </a:r>
-            <a:r>
-              <a:rPr lang="en-US" dirty="0"/>
-              <a:t>_ (teach) English, Math and Geography.</a:t>
-            </a:r>
-          </a:p>
-          <a:p>
-            <a:pPr marL="0" indent="0">
-              <a:spcBef>
-                <a:spcPts val="600"/>
-              </a:spcBef>
-              <a:buNone/>
-            </a:pPr>
-            <a:r>
-              <a:rPr lang="en-US" dirty="0"/>
-              <a:t>At the moment she _</a:t>
-            </a:r>
-            <a:r>
-              <a:rPr lang="en-US" u="sng" dirty="0">
-                <a:solidFill>
-                  <a:schemeClr val="bg1">
-                    <a:lumMod val="65000"/>
-                  </a:schemeClr>
-                </a:solidFill>
-              </a:rPr>
-              <a:t>is teaching</a:t>
-            </a:r>
-            <a:r>
-              <a:rPr lang="en-US" dirty="0"/>
-              <a:t>_ (teach) Math.</a:t>
-            </a:r>
-          </a:p>
-          <a:p>
-            <a:pPr marL="0" indent="0">
-              <a:spcBef>
-                <a:spcPts val="600"/>
-              </a:spcBef>
-              <a:buNone/>
-            </a:pPr>
-            <a:endParaRPr lang="en-US" dirty="0"/>
-          </a:p>
-          <a:p>
-            <a:pPr marL="0" indent="0">
-              <a:spcBef>
-                <a:spcPts val="600"/>
-              </a:spcBef>
-              <a:buNone/>
-            </a:pPr>
-            <a:endParaRPr lang="en-US" dirty="0"/>
-          </a:p>
-          <a:p>
-            <a:pPr marL="0" indent="0">
-              <a:spcBef>
-                <a:spcPts val="600"/>
-              </a:spcBef>
-              <a:buNone/>
-            </a:pPr>
-            <a:endParaRPr lang="en-US" dirty="0"/>
-          </a:p>
-          <a:p>
-            <a:pPr marL="0" indent="0">
-              <a:spcBef>
-                <a:spcPts val="600"/>
-              </a:spcBef>
-              <a:buNone/>
-            </a:pPr>
-            <a:endParaRPr lang="en-US" b="1" dirty="0"/>
-          </a:p>
-        </p:txBody>
-      </p:sp>
-      <p:pic>
-        <p:nvPicPr>
-          <p:cNvPr id="6" name="Picture 5">
-            <a:extLst>
-              <a:ext uri="{FF2B5EF4-FFF2-40B4-BE49-F238E27FC236}">
-                <a16:creationId xmlns:a16="http://schemas.microsoft.com/office/drawing/2014/main" id="{24BAD873-3FDB-4354-87CA-8626A450878A}"/>
-              </a:ext>
-            </a:extLst>
-          </p:cNvPr>
-          <p:cNvPicPr>
-            <a:picLocks noChangeAspect="1"/>
-          </p:cNvPicPr>
-          <p:nvPr/>
-        </p:nvPicPr>
-        <p:blipFill>
-          <a:blip r:embed="rId2">
-            <a:extLst>
-              <a:ext uri="{28A0092B-C50C-407E-A947-70E740481C1C}">
-                <a14:useLocalDpi xmlns:a14="http://schemas.microsoft.com/office/drawing/2010/main" val="0"/>
-              </a:ext>
-            </a:extLst>
-          </a:blip>
-          <a:stretch>
-            <a:fillRect/>
-          </a:stretch>
-        </p:blipFill>
-        <p:spPr>
-          <a:xfrm>
-            <a:off x="8609689" y="2416377"/>
-            <a:ext cx="3000375" cy="2724150"/>
-          </a:xfrm>
-          <a:prstGeom prst="rect">
-            <a:avLst/>
-          </a:prstGeom>
-        </p:spPr>
-      </p:pic>
-    </p:spTree>
-    <p:extLst>
-      <p:ext uri="{BB962C8B-B14F-4D97-AF65-F5344CB8AC3E}">
-        <p14:creationId xmlns:p14="http://schemas.microsoft.com/office/powerpoint/2010/main" val="2558254192"/>
-      </p:ext>
-    </p:extLst>
-  </p:cSld>
-  <p:clrMapOvr>
-    <a:masterClrMapping/>
-  </p:clrMapOvr>
-</p:sld>
-</file>
-
 <file path=ppt/slides/slide19.xml><?xml version="1.0" encoding="utf-8"?>
 <p:sld xmlns:a="http://schemas.openxmlformats.org/drawingml/2006/main" xmlns:r="http://schemas.openxmlformats.org/officeDocument/2006/relationships" xmlns:p="http://schemas.openxmlformats.org/presentationml/2006/main">
   <p:cSld>
@@ -6651,7 +6545,7 @@
           <a:p>
             <a:r>
               <a:rPr lang="en-US" sz="1800" dirty="0" err="1"/>
-              <a:t>lceGapMatch</a:t>
+              <a:t>lceTextEntry</a:t>
             </a:r>
             <a:endParaRPr lang="en-US" sz="1800" dirty="0"/>
           </a:p>
@@ -6676,13 +6570,11 @@
         <p:spPr>
           <a:xfrm>
             <a:off x="838200" y="1400458"/>
-            <a:ext cx="10515600" cy="4351338"/>
+            <a:ext cx="7933051" cy="4351338"/>
           </a:xfrm>
         </p:spPr>
         <p:txBody>
-          <a:bodyPr>
-            <a:normAutofit/>
-          </a:bodyPr>
+          <a:bodyPr/>
           <a:lstStyle/>
           <a:p>
             <a:pPr marL="0" indent="0">
@@ -6697,40 +6589,52 @@
                   <a:srgbClr val="0070C0"/>
                 </a:solidFill>
               </a:rPr>
-              <a:t>Richard III</a:t>
-            </a:r>
-          </a:p>
-          <a:p>
-            <a:pPr marL="0" indent="0">
+              <a:t>Mrs. White</a:t>
+            </a:r>
+          </a:p>
+          <a:p>
+            <a:pPr marL="0" indent="0">
+              <a:spcBef>
+                <a:spcPts val="600"/>
+              </a:spcBef>
               <a:buNone/>
             </a:pPr>
             <a:r>
               <a:rPr lang="en-US" dirty="0"/>
-              <a:t>Drag and drop the missing words in this famous quote from Shakespeare's Richard III.</a:t>
-            </a:r>
-          </a:p>
-          <a:p>
-            <a:pPr marL="0" indent="0">
-              <a:buNone/>
-            </a:pPr>
-            <a:r>
-              <a:rPr lang="en-US" i="1" dirty="0"/>
-              <a:t>spring   summer   autumn   winter</a:t>
-            </a:r>
-          </a:p>
-          <a:p>
-            <a:pPr marL="0" indent="0">
-              <a:buNone/>
-            </a:pPr>
-            <a:endParaRPr lang="en-US" sz="1200" dirty="0"/>
-          </a:p>
-          <a:p>
-            <a:pPr marL="0" indent="0">
+              <a:t>Present Simple vs Present Continuous.</a:t>
+            </a:r>
+          </a:p>
+          <a:p>
+            <a:pPr marL="0" indent="0">
+              <a:spcBef>
+                <a:spcPts val="600"/>
+              </a:spcBef>
               <a:buNone/>
             </a:pPr>
             <a:r>
               <a:rPr lang="en-US" dirty="0"/>
-              <a:t>Now is the _</a:t>
+              <a:t>Fill in the right form of the verb.</a:t>
+            </a:r>
+          </a:p>
+          <a:p>
+            <a:pPr marL="0" indent="0">
+              <a:spcBef>
+                <a:spcPts val="600"/>
+              </a:spcBef>
+              <a:buNone/>
+            </a:pPr>
+            <a:endParaRPr lang="en-US" dirty="0"/>
+          </a:p>
+          <a:p>
+            <a:pPr marL="0" indent="0">
+              <a:spcBef>
+                <a:spcPts val="600"/>
+              </a:spcBef>
+              <a:buNone/>
+            </a:pPr>
+            <a:r>
+              <a:rPr lang="en-US" dirty="0"/>
+              <a:t>This is Mrs. White. She _</a:t>
             </a:r>
             <a:r>
               <a:rPr lang="en-US" u="sng" dirty="0">
@@ -6740,20 +6644,23 @@
                   </a:schemeClr>
                 </a:solidFill>
               </a:rPr>
-              <a:t>winter</a:t>
+              <a:t>is</a:t>
             </a:r>
             <a:r>
               <a:rPr lang="en-US" dirty="0"/>
-              <a:t>_ of our discontent</a:t>
-            </a:r>
-          </a:p>
-          <a:p>
-            <a:pPr marL="0" indent="0">
+              <a:t>_ (be) a primary school teacher.</a:t>
+            </a:r>
+          </a:p>
+          <a:p>
+            <a:pPr marL="0" indent="0">
+              <a:spcBef>
+                <a:spcPts val="600"/>
+              </a:spcBef>
               <a:buNone/>
             </a:pPr>
             <a:r>
               <a:rPr lang="en-US" dirty="0"/>
-              <a:t>Made glorious _</a:t>
+              <a:t>She _</a:t>
             </a:r>
             <a:r>
               <a:rPr lang="en-US" u="sng" dirty="0">
@@ -6763,69 +6670,117 @@
                   </a:schemeClr>
                 </a:solidFill>
               </a:rPr>
-              <a:t>summer</a:t>
+              <a:t>teaches</a:t>
             </a:r>
             <a:r>
               <a:rPr lang="en-US" dirty="0"/>
-              <a:t>_ by this sun of York;</a:t>
-            </a:r>
-          </a:p>
-          <a:p>
-            <a:pPr marL="0" indent="0">
+              <a:t>_ (teach) English, Math and Geography.</a:t>
+            </a:r>
+          </a:p>
+          <a:p>
+            <a:pPr marL="0" indent="0">
+              <a:spcBef>
+                <a:spcPts val="600"/>
+              </a:spcBef>
               <a:buNone/>
             </a:pPr>
             <a:r>
               <a:rPr lang="en-US" dirty="0"/>
-              <a:t>And all the clouds that </a:t>
-            </a:r>
-            <a:r>
-              <a:rPr lang="en-US" dirty="0" err="1"/>
-              <a:t>lour'd</a:t>
+              <a:t>At the moment she _</a:t>
+            </a:r>
+            <a:r>
+              <a:rPr lang="en-US" u="sng" dirty="0">
+                <a:solidFill>
+                  <a:schemeClr val="bg1">
+                    <a:lumMod val="65000"/>
+                  </a:schemeClr>
+                </a:solidFill>
+              </a:rPr>
+              <a:t>is teaching</a:t>
             </a:r>
             <a:r>
               <a:rPr lang="en-US" dirty="0"/>
-              <a:t> upon our house</a:t>
-            </a:r>
-          </a:p>
-          <a:p>
-            <a:pPr marL="0" indent="0">
-              <a:buNone/>
-            </a:pPr>
-            <a:r>
-              <a:rPr lang="en-US" dirty="0"/>
-              <a:t>In the deep bosom of the ocean buried.</a:t>
-            </a:r>
-          </a:p>
-          <a:p>
-            <a:pPr marL="0" indent="0">
+              <a:t>_ (teach) Math.</a:t>
+            </a:r>
+          </a:p>
+          <a:p>
+            <a:pPr marL="0" indent="0">
+              <a:spcBef>
+                <a:spcPts val="600"/>
+              </a:spcBef>
               <a:buNone/>
             </a:pPr>
             <a:endParaRPr lang="en-US" dirty="0"/>
           </a:p>
           <a:p>
             <a:pPr marL="0" indent="0">
+              <a:spcBef>
+                <a:spcPts val="600"/>
+              </a:spcBef>
               <a:buNone/>
             </a:pPr>
             <a:endParaRPr lang="en-US" dirty="0"/>
           </a:p>
           <a:p>
             <a:pPr marL="0" indent="0">
+              <a:spcBef>
+                <a:spcPts val="600"/>
+              </a:spcBef>
               <a:buNone/>
             </a:pPr>
             <a:endParaRPr lang="en-US" dirty="0"/>
           </a:p>
           <a:p>
             <a:pPr marL="0" indent="0">
-              <a:buNone/>
-            </a:pPr>
-            <a:endParaRPr lang="en-US" dirty="0"/>
+              <a:spcBef>
+                <a:spcPts val="600"/>
+              </a:spcBef>
+              <a:buNone/>
+            </a:pPr>
+            <a:endParaRPr lang="en-US" b="1" dirty="0"/>
           </a:p>
         </p:txBody>
       </p:sp>
+      <p:pic>
+        <p:nvPicPr>
+          <p:cNvPr id="6" name="Picture 5">
+            <a:extLst>
+              <a:ext uri="{FF2B5EF4-FFF2-40B4-BE49-F238E27FC236}">
+                <a16:creationId xmlns:a16="http://schemas.microsoft.com/office/drawing/2014/main" id="{24BAD873-3FDB-4354-87CA-8626A450878A}"/>
+              </a:ext>
+            </a:extLst>
+          </p:cNvPr>
+          <p:cNvPicPr>
+            <a:picLocks noChangeAspect="1"/>
+          </p:cNvPicPr>
+          <p:nvPr/>
+        </p:nvPicPr>
+        <p:blipFill>
+          <a:blip r:embed="rId2">
+            <a:extLst>
+              <a:ext uri="{28A0092B-C50C-407E-A947-70E740481C1C}">
+                <a14:useLocalDpi xmlns:a14="http://schemas.microsoft.com/office/drawing/2010/main" val="0"/>
+              </a:ext>
+            </a:extLst>
+          </a:blip>
+          <a:stretch>
+            <a:fillRect/>
+          </a:stretch>
+        </p:blipFill>
+        <p:spPr>
+          <a:xfrm>
+            <a:off x="8609689" y="2416377"/>
+            <a:ext cx="3000375" cy="2724150"/>
+          </a:xfrm>
+          <a:prstGeom prst="rect">
+            <a:avLst/>
+          </a:prstGeom>
+        </p:spPr>
+      </p:pic>
     </p:spTree>
     <p:extLst>
       <p:ext uri="{BB962C8B-B14F-4D97-AF65-F5344CB8AC3E}">
-        <p14:creationId xmlns:p14="http://schemas.microsoft.com/office/powerpoint/2010/main" val="4129950077"/>
+        <p14:creationId xmlns:p14="http://schemas.microsoft.com/office/powerpoint/2010/main" val="2558254192"/>
       </p:ext>
     </p:extLst>
   </p:cSld>
@@ -6960,6 +6915,232 @@
 </file>
 
 <file path=ppt/slides/slide20.xml><?xml version="1.0" encoding="utf-8"?>
+<p:sld xmlns:a="http://schemas.openxmlformats.org/drawingml/2006/main" xmlns:r="http://schemas.openxmlformats.org/officeDocument/2006/relationships" xmlns:p="http://schemas.openxmlformats.org/presentationml/2006/main">
+  <p:cSld>
+    <p:spTree>
+      <p:nvGrpSpPr>
+        <p:cNvPr id="1" name=""/>
+        <p:cNvGrpSpPr/>
+        <p:nvPr/>
+      </p:nvGrpSpPr>
+      <p:grpSpPr>
+        <a:xfrm>
+          <a:off x="0" y="0"/>
+          <a:ext cx="0" cy="0"/>
+          <a:chOff x="0" y="0"/>
+          <a:chExt cx="0" cy="0"/>
+        </a:xfrm>
+      </p:grpSpPr>
+      <p:sp>
+        <p:nvSpPr>
+          <p:cNvPr id="2" name="Title 1">
+            <a:extLst>
+              <a:ext uri="{FF2B5EF4-FFF2-40B4-BE49-F238E27FC236}">
+                <a16:creationId xmlns:a16="http://schemas.microsoft.com/office/drawing/2014/main" id="{17546CFD-B71A-4805-8A6B-CAD10705209B}"/>
+              </a:ext>
+            </a:extLst>
+          </p:cNvPr>
+          <p:cNvSpPr>
+            <a:spLocks noGrp="1"/>
+          </p:cNvSpPr>
+          <p:nvPr>
+            <p:ph type="title"/>
+          </p:nvPr>
+        </p:nvSpPr>
+        <p:spPr/>
+        <p:txBody>
+          <a:bodyPr>
+            <a:normAutofit/>
+          </a:bodyPr>
+          <a:lstStyle/>
+          <a:p>
+            <a:r>
+              <a:rPr lang="en-US" sz="1800" dirty="0" err="1"/>
+              <a:t>lceGapMatch</a:t>
+            </a:r>
+            <a:endParaRPr lang="en-US" sz="1800" dirty="0"/>
+          </a:p>
+        </p:txBody>
+      </p:sp>
+      <p:sp>
+        <p:nvSpPr>
+          <p:cNvPr id="3" name="Content Placeholder 2">
+            <a:extLst>
+              <a:ext uri="{FF2B5EF4-FFF2-40B4-BE49-F238E27FC236}">
+                <a16:creationId xmlns:a16="http://schemas.microsoft.com/office/drawing/2014/main" id="{A1AE635E-6BEE-4A3D-BEC1-B1DA65CC3055}"/>
+              </a:ext>
+            </a:extLst>
+          </p:cNvPr>
+          <p:cNvSpPr>
+            <a:spLocks noGrp="1"/>
+          </p:cNvSpPr>
+          <p:nvPr>
+            <p:ph idx="1"/>
+          </p:nvPr>
+        </p:nvSpPr>
+        <p:spPr>
+          <a:xfrm>
+            <a:off x="838200" y="1400458"/>
+            <a:ext cx="10515600" cy="4351338"/>
+          </a:xfrm>
+        </p:spPr>
+        <p:txBody>
+          <a:bodyPr>
+            <a:normAutofit/>
+          </a:bodyPr>
+          <a:lstStyle/>
+          <a:p>
+            <a:pPr marL="0" indent="0">
+              <a:spcBef>
+                <a:spcPts val="600"/>
+              </a:spcBef>
+              <a:buNone/>
+            </a:pPr>
+            <a:r>
+              <a:rPr lang="en-US" b="1" dirty="0">
+                <a:solidFill>
+                  <a:srgbClr val="0070C0"/>
+                </a:solidFill>
+              </a:rPr>
+              <a:t>Richard III</a:t>
+            </a:r>
+          </a:p>
+          <a:p>
+            <a:pPr marL="0" indent="0">
+              <a:buNone/>
+            </a:pPr>
+            <a:r>
+              <a:rPr lang="en-US" dirty="0"/>
+              <a:t>Drag and drop the missing words in this famous quote from Shakespeare's Richard III.</a:t>
+            </a:r>
+          </a:p>
+          <a:p>
+            <a:pPr marL="0" indent="0">
+              <a:buNone/>
+            </a:pPr>
+            <a:r>
+              <a:rPr lang="en-US" i="1" dirty="0"/>
+              <a:t>spring   summer   autumn   winter</a:t>
+            </a:r>
+          </a:p>
+          <a:p>
+            <a:pPr marL="0" indent="0">
+              <a:buNone/>
+            </a:pPr>
+            <a:endParaRPr lang="en-US" sz="1200" dirty="0"/>
+          </a:p>
+          <a:p>
+            <a:pPr marL="0" indent="0">
+              <a:buNone/>
+            </a:pPr>
+            <a:r>
+              <a:rPr lang="en-US" dirty="0"/>
+              <a:t>Now is the _</a:t>
+            </a:r>
+            <a:r>
+              <a:rPr lang="en-US" u="sng" dirty="0">
+                <a:solidFill>
+                  <a:schemeClr val="bg1">
+                    <a:lumMod val="65000"/>
+                  </a:schemeClr>
+                </a:solidFill>
+              </a:rPr>
+              <a:t>winter</a:t>
+            </a:r>
+            <a:r>
+              <a:rPr lang="en-US" dirty="0"/>
+              <a:t>_ of our discontent</a:t>
+            </a:r>
+          </a:p>
+          <a:p>
+            <a:pPr marL="0" indent="0">
+              <a:buNone/>
+            </a:pPr>
+            <a:r>
+              <a:rPr lang="en-US" dirty="0"/>
+              <a:t>Made glorious _</a:t>
+            </a:r>
+            <a:r>
+              <a:rPr lang="en-US" u="sng" dirty="0">
+                <a:solidFill>
+                  <a:schemeClr val="bg1">
+                    <a:lumMod val="65000"/>
+                  </a:schemeClr>
+                </a:solidFill>
+              </a:rPr>
+              <a:t>summer</a:t>
+            </a:r>
+            <a:r>
+              <a:rPr lang="en-US" dirty="0"/>
+              <a:t>_ by this sun of York;</a:t>
+            </a:r>
+          </a:p>
+          <a:p>
+            <a:pPr marL="0" indent="0">
+              <a:buNone/>
+            </a:pPr>
+            <a:r>
+              <a:rPr lang="en-US" dirty="0"/>
+              <a:t>And all the clouds that </a:t>
+            </a:r>
+            <a:r>
+              <a:rPr lang="en-US" dirty="0" err="1"/>
+              <a:t>lour'd</a:t>
+            </a:r>
+            <a:r>
+              <a:rPr lang="en-US" dirty="0"/>
+              <a:t> upon our house</a:t>
+            </a:r>
+          </a:p>
+          <a:p>
+            <a:pPr marL="0" indent="0">
+              <a:buNone/>
+            </a:pPr>
+            <a:r>
+              <a:rPr lang="en-US" dirty="0"/>
+              <a:t>In the deep bosom of the ocean buried.</a:t>
+            </a:r>
+          </a:p>
+          <a:p>
+            <a:pPr marL="0" indent="0">
+              <a:buNone/>
+            </a:pPr>
+            <a:endParaRPr lang="en-US" dirty="0"/>
+          </a:p>
+          <a:p>
+            <a:pPr marL="0" indent="0">
+              <a:buNone/>
+            </a:pPr>
+            <a:endParaRPr lang="en-US" dirty="0"/>
+          </a:p>
+          <a:p>
+            <a:pPr marL="0" indent="0">
+              <a:buNone/>
+            </a:pPr>
+            <a:endParaRPr lang="en-US" dirty="0"/>
+          </a:p>
+          <a:p>
+            <a:pPr marL="0" indent="0">
+              <a:buNone/>
+            </a:pPr>
+            <a:endParaRPr lang="en-US" dirty="0"/>
+          </a:p>
+        </p:txBody>
+      </p:sp>
+    </p:spTree>
+    <p:extLst>
+      <p:ext uri="{BB962C8B-B14F-4D97-AF65-F5344CB8AC3E}">
+        <p14:creationId xmlns:p14="http://schemas.microsoft.com/office/powerpoint/2010/main" val="4129950077"/>
+      </p:ext>
+    </p:extLst>
+  </p:cSld>
+  <p:clrMapOvr>
+    <a:masterClrMapping/>
+  </p:clrMapOvr>
+</p:sld>
+</file>
+
+<file path=ppt/slides/slide21.xml><?xml version="1.0" encoding="utf-8"?>
 <p:sld xmlns:a="http://schemas.openxmlformats.org/drawingml/2006/main" xmlns:r="http://schemas.openxmlformats.org/officeDocument/2006/relationships" xmlns:p="http://schemas.openxmlformats.org/presentationml/2006/main">
   <p:cSld>
     <p:spTree>
@@ -7288,7 +7469,7 @@
 </p:sld>
 </file>
 
-<file path=ppt/slides/slide21.xml><?xml version="1.0" encoding="utf-8"?>
+<file path=ppt/slides/slide22.xml><?xml version="1.0" encoding="utf-8"?>
 <p:sld xmlns:a="http://schemas.openxmlformats.org/drawingml/2006/main" xmlns:r="http://schemas.openxmlformats.org/officeDocument/2006/relationships" xmlns:p="http://schemas.openxmlformats.org/presentationml/2006/main">
   <p:cSld>
     <p:spTree>
@@ -7492,7 +7673,7 @@
 </p:sld>
 </file>
 
-<file path=ppt/slides/slide22.xml><?xml version="1.0" encoding="utf-8"?>
+<file path=ppt/slides/slide23.xml><?xml version="1.0" encoding="utf-8"?>
 <p:sld xmlns:a="http://schemas.openxmlformats.org/drawingml/2006/main" xmlns:r="http://schemas.openxmlformats.org/officeDocument/2006/relationships" xmlns:p="http://schemas.openxmlformats.org/presentationml/2006/main">
   <p:cSld>
     <p:spTree>
@@ -7810,7 +7991,7 @@
 </p:sld>
 </file>
 
-<file path=ppt/slides/slide23.xml><?xml version="1.0" encoding="utf-8"?>
+<file path=ppt/slides/slide24.xml><?xml version="1.0" encoding="utf-8"?>
 <p:sld xmlns:a="http://schemas.openxmlformats.org/drawingml/2006/main" xmlns:r="http://schemas.openxmlformats.org/officeDocument/2006/relationships" xmlns:p="http://schemas.openxmlformats.org/presentationml/2006/main">
   <p:cSld>
     <p:spTree>

</xml_diff>